<commit_message>
HTML code  for the form
</commit_message>
<xml_diff>
--- a/Description/InputEventReservation.pptx
+++ b/Description/InputEventReservation.pptx
@@ -3203,7 +3203,7 @@
             </a:r>
             <a:r>
               <a:rPr lang="de-CH" sz="1100" b="1" dirty="0" err="1"/>
-              <a:t>_div_head</a:t>
+              <a:t>_div_header</a:t>
             </a:r>
             <a:endParaRPr lang="de-CH" b="1" dirty="0"/>
           </a:p>
@@ -3591,8 +3591,8 @@
         </p:nvSpPr>
         <p:spPr>
           <a:xfrm>
-            <a:off x="5820417" y="2305215"/>
-            <a:ext cx="2554665" cy="237439"/>
+            <a:off x="5820418" y="2305215"/>
+            <a:ext cx="2098098" cy="237439"/>
           </a:xfrm>
           <a:prstGeom prst="rect">
             <a:avLst/>
@@ -3663,7 +3663,7 @@
             </a:r>
             <a:r>
               <a:rPr lang="de-CH" sz="1100" b="1" dirty="0" err="1"/>
-              <a:t>_name</a:t>
+              <a:t>_div_name</a:t>
             </a:r>
             <a:endParaRPr lang="de-CH" b="1" dirty="0"/>
           </a:p>
@@ -3683,8 +3683,8 @@
         </p:nvSpPr>
         <p:spPr>
           <a:xfrm>
-            <a:off x="8478778" y="2305214"/>
-            <a:ext cx="1461824" cy="237439"/>
+            <a:off x="8187216" y="2305214"/>
+            <a:ext cx="1753386" cy="237439"/>
           </a:xfrm>
           <a:prstGeom prst="rect">
             <a:avLst/>
@@ -3735,8 +3735,8 @@
         </p:nvSpPr>
         <p:spPr>
           <a:xfrm>
-            <a:off x="8478778" y="2284004"/>
-            <a:ext cx="1461824" cy="261610"/>
+            <a:off x="8144762" y="2295009"/>
+            <a:ext cx="1941904" cy="261610"/>
           </a:xfrm>
           <a:prstGeom prst="rect">
             <a:avLst/>
@@ -3755,7 +3755,7 @@
             </a:r>
             <a:r>
               <a:rPr lang="de-CH" sz="1100" b="1" dirty="0" err="1"/>
-              <a:t>_name_info</a:t>
+              <a:t>_div_info_name</a:t>
             </a:r>
             <a:endParaRPr lang="de-CH" b="1" dirty="0"/>
           </a:p>
@@ -3959,8 +3959,8 @@
         </p:nvSpPr>
         <p:spPr>
           <a:xfrm>
-            <a:off x="5820417" y="3377683"/>
-            <a:ext cx="2554665" cy="237439"/>
+            <a:off x="5820418" y="3377683"/>
+            <a:ext cx="2098098" cy="237439"/>
           </a:xfrm>
           <a:prstGeom prst="rect">
             <a:avLst/>
@@ -4031,7 +4031,7 @@
             </a:r>
             <a:r>
               <a:rPr lang="de-CH" sz="1100" b="1" dirty="0" err="1"/>
-              <a:t>_label</a:t>
+              <a:t>_div_email</a:t>
             </a:r>
             <a:endParaRPr lang="de-CH" b="1" dirty="0"/>
           </a:p>
@@ -4051,8 +4051,8 @@
         </p:nvSpPr>
         <p:spPr>
           <a:xfrm>
-            <a:off x="8478778" y="3377682"/>
-            <a:ext cx="1461824" cy="237439"/>
+            <a:off x="8187216" y="3377682"/>
+            <a:ext cx="1753386" cy="237439"/>
           </a:xfrm>
           <a:prstGeom prst="rect">
             <a:avLst/>
@@ -4103,8 +4103,8 @@
         </p:nvSpPr>
         <p:spPr>
           <a:xfrm>
-            <a:off x="8478778" y="3356472"/>
-            <a:ext cx="1461824" cy="261610"/>
+            <a:off x="8134099" y="3346380"/>
+            <a:ext cx="1805562" cy="261610"/>
           </a:xfrm>
           <a:prstGeom prst="rect">
             <a:avLst/>
@@ -4123,7 +4123,7 @@
             </a:r>
             <a:r>
               <a:rPr lang="de-CH" sz="1100" b="1" dirty="0" err="1"/>
-              <a:t>_label_info</a:t>
+              <a:t>_div_info_email</a:t>
             </a:r>
             <a:endParaRPr lang="de-CH" b="1" dirty="0"/>
           </a:p>
@@ -4327,8 +4327,8 @@
         </p:nvSpPr>
         <p:spPr>
           <a:xfrm>
-            <a:off x="5828891" y="4451283"/>
-            <a:ext cx="2554665" cy="237439"/>
+            <a:off x="5828892" y="4451283"/>
+            <a:ext cx="2098098" cy="237439"/>
           </a:xfrm>
           <a:prstGeom prst="rect">
             <a:avLst/>
@@ -4399,7 +4399,7 @@
             </a:r>
             <a:r>
               <a:rPr lang="de-CH" sz="1100" b="1" dirty="0" err="1"/>
-              <a:t>_remark</a:t>
+              <a:t>_div_remark</a:t>
             </a:r>
             <a:endParaRPr lang="de-CH" b="1" dirty="0"/>
           </a:p>
@@ -4419,8 +4419,8 @@
         </p:nvSpPr>
         <p:spPr>
           <a:xfrm>
-            <a:off x="8487252" y="4451282"/>
-            <a:ext cx="1461824" cy="237439"/>
+            <a:off x="8195690" y="4451282"/>
+            <a:ext cx="1753386" cy="237439"/>
           </a:xfrm>
           <a:prstGeom prst="rect">
             <a:avLst/>
@@ -4471,8 +4471,8 @@
         </p:nvSpPr>
         <p:spPr>
           <a:xfrm>
-            <a:off x="8487252" y="4430072"/>
-            <a:ext cx="1461824" cy="430887"/>
+            <a:off x="8158655" y="4420742"/>
+            <a:ext cx="1840047" cy="261610"/>
           </a:xfrm>
           <a:prstGeom prst="rect">
             <a:avLst/>
@@ -4491,7 +4491,7 @@
             </a:r>
             <a:r>
               <a:rPr lang="de-CH" sz="1100" b="1" dirty="0" err="1"/>
-              <a:t>_remark_info</a:t>
+              <a:t>_div_info_remark</a:t>
             </a:r>
             <a:endParaRPr lang="de-CH" b="1" dirty="0"/>
           </a:p>
@@ -4603,8 +4603,8 @@
         </p:nvSpPr>
         <p:spPr>
           <a:xfrm>
-            <a:off x="5819476" y="5274681"/>
-            <a:ext cx="2554665" cy="237439"/>
+            <a:off x="5819477" y="5274681"/>
+            <a:ext cx="2098098" cy="237439"/>
           </a:xfrm>
           <a:prstGeom prst="rect">
             <a:avLst/>
@@ -4695,8 +4695,8 @@
         </p:nvSpPr>
         <p:spPr>
           <a:xfrm>
-            <a:off x="8477837" y="5274680"/>
-            <a:ext cx="1461824" cy="237439"/>
+            <a:off x="8186275" y="5274680"/>
+            <a:ext cx="1753386" cy="237439"/>
           </a:xfrm>
           <a:prstGeom prst="rect">
             <a:avLst/>
@@ -4747,7 +4747,7 @@
         </p:nvSpPr>
         <p:spPr>
           <a:xfrm>
-            <a:off x="8477837" y="5253470"/>
+            <a:off x="8144762" y="5254163"/>
             <a:ext cx="1853940" cy="261610"/>
           </a:xfrm>
           <a:prstGeom prst="rect">
@@ -4763,11 +4763,19 @@
           <a:p>
             <a:r>
               <a:rPr lang="de-CH" sz="1100" b="1" i="1" dirty="0" err="1"/>
-              <a:t>id_unique</a:t>
+              <a:t>id_</a:t>
+            </a:r>
+            <a:r>
+              <a:rPr lang="de-CH" sz="1100" b="1" i="1" err="1"/>
+              <a:t>unique</a:t>
+            </a:r>
+            <a:r>
+              <a:rPr lang="de-CH" sz="1100" b="1"/>
+              <a:t>_div_info</a:t>
             </a:r>
             <a:r>
               <a:rPr lang="de-CH" sz="1100" b="1" dirty="0" err="1"/>
-              <a:t>_button_info</a:t>
+              <a:t>_button</a:t>
             </a:r>
             <a:endParaRPr lang="de-CH" b="1" dirty="0"/>
           </a:p>

</xml_diff>

<commit_message>
Split of file InputEventReservation.js
</commit_message>
<xml_diff>
--- a/Description/InputEventReservation.pptx
+++ b/Description/InputEventReservation.pptx
@@ -269,7 +269,7 @@
           <a:p>
             <a:fld id="{DDCE6D58-9B57-4731-A47B-3CD41B48F0A9}" type="datetimeFigureOut">
               <a:rPr lang="de-CH" smtClean="0"/>
-              <a:t>17.12.2024</a:t>
+              <a:t>18.12.2024</a:t>
             </a:fld>
             <a:endParaRPr lang="de-CH"/>
           </a:p>
@@ -439,7 +439,7 @@
           <a:p>
             <a:fld id="{DDCE6D58-9B57-4731-A47B-3CD41B48F0A9}" type="datetimeFigureOut">
               <a:rPr lang="de-CH" smtClean="0"/>
-              <a:t>17.12.2024</a:t>
+              <a:t>18.12.2024</a:t>
             </a:fld>
             <a:endParaRPr lang="de-CH"/>
           </a:p>
@@ -619,7 +619,7 @@
           <a:p>
             <a:fld id="{DDCE6D58-9B57-4731-A47B-3CD41B48F0A9}" type="datetimeFigureOut">
               <a:rPr lang="de-CH" smtClean="0"/>
-              <a:t>17.12.2024</a:t>
+              <a:t>18.12.2024</a:t>
             </a:fld>
             <a:endParaRPr lang="de-CH"/>
           </a:p>
@@ -789,7 +789,7 @@
           <a:p>
             <a:fld id="{DDCE6D58-9B57-4731-A47B-3CD41B48F0A9}" type="datetimeFigureOut">
               <a:rPr lang="de-CH" smtClean="0"/>
-              <a:t>17.12.2024</a:t>
+              <a:t>18.12.2024</a:t>
             </a:fld>
             <a:endParaRPr lang="de-CH"/>
           </a:p>
@@ -1035,7 +1035,7 @@
           <a:p>
             <a:fld id="{DDCE6D58-9B57-4731-A47B-3CD41B48F0A9}" type="datetimeFigureOut">
               <a:rPr lang="de-CH" smtClean="0"/>
-              <a:t>17.12.2024</a:t>
+              <a:t>18.12.2024</a:t>
             </a:fld>
             <a:endParaRPr lang="de-CH"/>
           </a:p>
@@ -1267,7 +1267,7 @@
           <a:p>
             <a:fld id="{DDCE6D58-9B57-4731-A47B-3CD41B48F0A9}" type="datetimeFigureOut">
               <a:rPr lang="de-CH" smtClean="0"/>
-              <a:t>17.12.2024</a:t>
+              <a:t>18.12.2024</a:t>
             </a:fld>
             <a:endParaRPr lang="de-CH"/>
           </a:p>
@@ -1634,7 +1634,7 @@
           <a:p>
             <a:fld id="{DDCE6D58-9B57-4731-A47B-3CD41B48F0A9}" type="datetimeFigureOut">
               <a:rPr lang="de-CH" smtClean="0"/>
-              <a:t>17.12.2024</a:t>
+              <a:t>18.12.2024</a:t>
             </a:fld>
             <a:endParaRPr lang="de-CH"/>
           </a:p>
@@ -1752,7 +1752,7 @@
           <a:p>
             <a:fld id="{DDCE6D58-9B57-4731-A47B-3CD41B48F0A9}" type="datetimeFigureOut">
               <a:rPr lang="de-CH" smtClean="0"/>
-              <a:t>17.12.2024</a:t>
+              <a:t>18.12.2024</a:t>
             </a:fld>
             <a:endParaRPr lang="de-CH"/>
           </a:p>
@@ -1847,7 +1847,7 @@
           <a:p>
             <a:fld id="{DDCE6D58-9B57-4731-A47B-3CD41B48F0A9}" type="datetimeFigureOut">
               <a:rPr lang="de-CH" smtClean="0"/>
-              <a:t>17.12.2024</a:t>
+              <a:t>18.12.2024</a:t>
             </a:fld>
             <a:endParaRPr lang="de-CH"/>
           </a:p>
@@ -2124,7 +2124,7 @@
           <a:p>
             <a:fld id="{DDCE6D58-9B57-4731-A47B-3CD41B48F0A9}" type="datetimeFigureOut">
               <a:rPr lang="de-CH" smtClean="0"/>
-              <a:t>17.12.2024</a:t>
+              <a:t>18.12.2024</a:t>
             </a:fld>
             <a:endParaRPr lang="de-CH"/>
           </a:p>
@@ -2377,7 +2377,7 @@
           <a:p>
             <a:fld id="{DDCE6D58-9B57-4731-A47B-3CD41B48F0A9}" type="datetimeFigureOut">
               <a:rPr lang="de-CH" smtClean="0"/>
-              <a:t>17.12.2024</a:t>
+              <a:t>18.12.2024</a:t>
             </a:fld>
             <a:endParaRPr lang="de-CH"/>
           </a:p>
@@ -2590,7 +2590,7 @@
           <a:p>
             <a:fld id="{DDCE6D58-9B57-4731-A47B-3CD41B48F0A9}" type="datetimeFigureOut">
               <a:rPr lang="de-CH" smtClean="0"/>
-              <a:t>17.12.2024</a:t>
+              <a:t>18.12.2024</a:t>
             </a:fld>
             <a:endParaRPr lang="de-CH"/>
           </a:p>

</xml_diff>

<commit_message>
Dropdown member functions in InputEventReservation
</commit_message>
<xml_diff>
--- a/Description/InputEventReservation.pptx
+++ b/Description/InputEventReservation.pptx
@@ -271,7 +271,7 @@
           <a:p>
             <a:fld id="{DDCE6D58-9B57-4731-A47B-3CD41B48F0A9}" type="datetimeFigureOut">
               <a:rPr lang="de-CH" smtClean="0"/>
-              <a:t>20.12.2024</a:t>
+              <a:t>21.12.2024</a:t>
             </a:fld>
             <a:endParaRPr lang="de-CH"/>
           </a:p>
@@ -441,7 +441,7 @@
           <a:p>
             <a:fld id="{DDCE6D58-9B57-4731-A47B-3CD41B48F0A9}" type="datetimeFigureOut">
               <a:rPr lang="de-CH" smtClean="0"/>
-              <a:t>20.12.2024</a:t>
+              <a:t>21.12.2024</a:t>
             </a:fld>
             <a:endParaRPr lang="de-CH"/>
           </a:p>
@@ -621,7 +621,7 @@
           <a:p>
             <a:fld id="{DDCE6D58-9B57-4731-A47B-3CD41B48F0A9}" type="datetimeFigureOut">
               <a:rPr lang="de-CH" smtClean="0"/>
-              <a:t>20.12.2024</a:t>
+              <a:t>21.12.2024</a:t>
             </a:fld>
             <a:endParaRPr lang="de-CH"/>
           </a:p>
@@ -791,7 +791,7 @@
           <a:p>
             <a:fld id="{DDCE6D58-9B57-4731-A47B-3CD41B48F0A9}" type="datetimeFigureOut">
               <a:rPr lang="de-CH" smtClean="0"/>
-              <a:t>20.12.2024</a:t>
+              <a:t>21.12.2024</a:t>
             </a:fld>
             <a:endParaRPr lang="de-CH"/>
           </a:p>
@@ -1037,7 +1037,7 @@
           <a:p>
             <a:fld id="{DDCE6D58-9B57-4731-A47B-3CD41B48F0A9}" type="datetimeFigureOut">
               <a:rPr lang="de-CH" smtClean="0"/>
-              <a:t>20.12.2024</a:t>
+              <a:t>21.12.2024</a:t>
             </a:fld>
             <a:endParaRPr lang="de-CH"/>
           </a:p>
@@ -1269,7 +1269,7 @@
           <a:p>
             <a:fld id="{DDCE6D58-9B57-4731-A47B-3CD41B48F0A9}" type="datetimeFigureOut">
               <a:rPr lang="de-CH" smtClean="0"/>
-              <a:t>20.12.2024</a:t>
+              <a:t>21.12.2024</a:t>
             </a:fld>
             <a:endParaRPr lang="de-CH"/>
           </a:p>
@@ -1636,7 +1636,7 @@
           <a:p>
             <a:fld id="{DDCE6D58-9B57-4731-A47B-3CD41B48F0A9}" type="datetimeFigureOut">
               <a:rPr lang="de-CH" smtClean="0"/>
-              <a:t>20.12.2024</a:t>
+              <a:t>21.12.2024</a:t>
             </a:fld>
             <a:endParaRPr lang="de-CH"/>
           </a:p>
@@ -1754,7 +1754,7 @@
           <a:p>
             <a:fld id="{DDCE6D58-9B57-4731-A47B-3CD41B48F0A9}" type="datetimeFigureOut">
               <a:rPr lang="de-CH" smtClean="0"/>
-              <a:t>20.12.2024</a:t>
+              <a:t>21.12.2024</a:t>
             </a:fld>
             <a:endParaRPr lang="de-CH"/>
           </a:p>
@@ -1849,7 +1849,7 @@
           <a:p>
             <a:fld id="{DDCE6D58-9B57-4731-A47B-3CD41B48F0A9}" type="datetimeFigureOut">
               <a:rPr lang="de-CH" smtClean="0"/>
-              <a:t>20.12.2024</a:t>
+              <a:t>21.12.2024</a:t>
             </a:fld>
             <a:endParaRPr lang="de-CH"/>
           </a:p>
@@ -2126,7 +2126,7 @@
           <a:p>
             <a:fld id="{DDCE6D58-9B57-4731-A47B-3CD41B48F0A9}" type="datetimeFigureOut">
               <a:rPr lang="de-CH" smtClean="0"/>
-              <a:t>20.12.2024</a:t>
+              <a:t>21.12.2024</a:t>
             </a:fld>
             <a:endParaRPr lang="de-CH"/>
           </a:p>
@@ -2379,7 +2379,7 @@
           <a:p>
             <a:fld id="{DDCE6D58-9B57-4731-A47B-3CD41B48F0A9}" type="datetimeFigureOut">
               <a:rPr lang="de-CH" smtClean="0"/>
-              <a:t>20.12.2024</a:t>
+              <a:t>21.12.2024</a:t>
             </a:fld>
             <a:endParaRPr lang="de-CH"/>
           </a:p>
@@ -2592,7 +2592,7 @@
           <a:p>
             <a:fld id="{DDCE6D58-9B57-4731-A47B-3CD41B48F0A9}" type="datetimeFigureOut">
               <a:rPr lang="de-CH" smtClean="0"/>
-              <a:t>20.12.2024</a:t>
+              <a:t>21.12.2024</a:t>
             </a:fld>
             <a:endParaRPr lang="de-CH"/>
           </a:p>
@@ -6389,7 +6389,19 @@
                 <a:latin typeface="Arial" panose="020B0604020202020204" pitchFamily="34" charset="0"/>
                 <a:cs typeface="Arial" panose="020B0604020202020204" pitchFamily="34" charset="0"/>
               </a:rPr>
-              <a:t>        Sets </a:t>
+              <a:t>        Creates (displays) the reservation input form</a:t>
+            </a:r>
+          </a:p>
+          <a:p>
+            <a:r>
+              <a:rPr lang="en-US" sz="1200" b="1" i="1" dirty="0">
+                <a:solidFill>
+                  <a:schemeClr val="tx1"/>
+                </a:solidFill>
+                <a:latin typeface="Arial" panose="020B0604020202020204" pitchFamily="34" charset="0"/>
+                <a:cs typeface="Arial" panose="020B0604020202020204" pitchFamily="34" charset="0"/>
+              </a:rPr>
+              <a:t>        Optionally set </a:t>
             </a:r>
             <a:r>
               <a:rPr lang="en-US" sz="1200" b="1" i="1" dirty="0" err="1">
@@ -6410,18 +6422,6 @@
                 <a:cs typeface="Arial" panose="020B0604020202020204" pitchFamily="34" charset="0"/>
               </a:rPr>
               <a:t> parameters</a:t>
-            </a:r>
-          </a:p>
-          <a:p>
-            <a:r>
-              <a:rPr lang="en-US" sz="1200" b="1" i="1" dirty="0">
-                <a:solidFill>
-                  <a:schemeClr val="tx1"/>
-                </a:solidFill>
-                <a:latin typeface="Arial" panose="020B0604020202020204" pitchFamily="34" charset="0"/>
-                <a:cs typeface="Arial" panose="020B0604020202020204" pitchFamily="34" charset="0"/>
-              </a:rPr>
-              <a:t>        Creates (displays) the reservation input form</a:t>
             </a:r>
           </a:p>
         </p:txBody>
@@ -7084,15 +7084,16 @@
               </a:rPr>
               <a:t>contentHeader</a:t>
             </a:r>
-            <a:endParaRPr lang="de-CH" sz="1000" b="1" dirty="0">
-              <a:solidFill>
-                <a:schemeClr val="tx1"/>
-              </a:solidFill>
-              <a:latin typeface="Arial" panose="020B0604020202020204" pitchFamily="34" charset="0"/>
-              <a:cs typeface="Arial" panose="020B0604020202020204" pitchFamily="34" charset="0"/>
-            </a:endParaRPr>
-          </a:p>
-          <a:p>
+            <a:r>
+              <a:rPr lang="de-CH" sz="1000" b="1" dirty="0">
+                <a:solidFill>
+                  <a:schemeClr val="tx1"/>
+                </a:solidFill>
+                <a:latin typeface="Arial" panose="020B0604020202020204" pitchFamily="34" charset="0"/>
+                <a:cs typeface="Arial" panose="020B0604020202020204" pitchFamily="34" charset="0"/>
+              </a:rPr>
+              <a:t>, </a:t>
+            </a:r>
             <a:r>
               <a:rPr lang="de-CH" sz="1000" b="1" dirty="0" err="1">
                 <a:solidFill>
@@ -7103,6 +7104,266 @@
               </a:rPr>
               <a:t>contentLabelName</a:t>
             </a:r>
+            <a:r>
+              <a:rPr lang="en-US" sz="1000" b="1" dirty="0">
+                <a:solidFill>
+                  <a:schemeClr val="tx1"/>
+                </a:solidFill>
+                <a:latin typeface="Arial" panose="020B0604020202020204" pitchFamily="34" charset="0"/>
+                <a:cs typeface="Arial" panose="020B0604020202020204" pitchFamily="34" charset="0"/>
+              </a:rPr>
+              <a:t>, </a:t>
+            </a:r>
+            <a:r>
+              <a:rPr lang="en-US" sz="1000" b="1" dirty="0" err="1">
+                <a:solidFill>
+                  <a:schemeClr val="tx1"/>
+                </a:solidFill>
+                <a:latin typeface="Arial" panose="020B0604020202020204" pitchFamily="34" charset="0"/>
+                <a:cs typeface="Arial" panose="020B0604020202020204" pitchFamily="34" charset="0"/>
+              </a:rPr>
+              <a:t>contentLabelEmail</a:t>
+            </a:r>
+            <a:r>
+              <a:rPr lang="en-US" sz="1000" b="1" dirty="0">
+                <a:solidFill>
+                  <a:schemeClr val="tx1"/>
+                </a:solidFill>
+                <a:latin typeface="Arial" panose="020B0604020202020204" pitchFamily="34" charset="0"/>
+                <a:cs typeface="Arial" panose="020B0604020202020204" pitchFamily="34" charset="0"/>
+              </a:rPr>
+              <a:t>, </a:t>
+            </a:r>
+            <a:r>
+              <a:rPr lang="en-US" sz="1000" b="1" dirty="0" err="1">
+                <a:solidFill>
+                  <a:schemeClr val="tx1"/>
+                </a:solidFill>
+                <a:latin typeface="Arial" panose="020B0604020202020204" pitchFamily="34" charset="0"/>
+                <a:cs typeface="Arial" panose="020B0604020202020204" pitchFamily="34" charset="0"/>
+              </a:rPr>
+              <a:t>contentLabelRemark</a:t>
+            </a:r>
+            <a:r>
+              <a:rPr lang="en-US" sz="1000" b="1" dirty="0">
+                <a:solidFill>
+                  <a:schemeClr val="tx1"/>
+                </a:solidFill>
+                <a:latin typeface="Arial" panose="020B0604020202020204" pitchFamily="34" charset="0"/>
+                <a:cs typeface="Arial" panose="020B0604020202020204" pitchFamily="34" charset="0"/>
+              </a:rPr>
+              <a:t>, </a:t>
+            </a:r>
+            <a:r>
+              <a:rPr lang="en-US" sz="1000" b="1" dirty="0" err="1">
+                <a:solidFill>
+                  <a:schemeClr val="tx1"/>
+                </a:solidFill>
+                <a:latin typeface="Arial" panose="020B0604020202020204" pitchFamily="34" charset="0"/>
+                <a:cs typeface="Arial" panose="020B0604020202020204" pitchFamily="34" charset="0"/>
+              </a:rPr>
+              <a:t>contentDropdown</a:t>
+            </a:r>
+            <a:r>
+              <a:rPr lang="en-US" sz="1000" b="1" dirty="0">
+                <a:solidFill>
+                  <a:schemeClr val="tx1"/>
+                </a:solidFill>
+                <a:latin typeface="Arial" panose="020B0604020202020204" pitchFamily="34" charset="0"/>
+                <a:cs typeface="Arial" panose="020B0604020202020204" pitchFamily="34" charset="0"/>
+              </a:rPr>
+              <a:t>, </a:t>
+            </a:r>
+            <a:r>
+              <a:rPr lang="en-US" sz="1000" b="1" dirty="0" err="1">
+                <a:solidFill>
+                  <a:schemeClr val="tx1"/>
+                </a:solidFill>
+                <a:latin typeface="Arial" panose="020B0604020202020204" pitchFamily="34" charset="0"/>
+                <a:cs typeface="Arial" panose="020B0604020202020204" pitchFamily="34" charset="0"/>
+              </a:rPr>
+              <a:t>contentNameInfo</a:t>
+            </a:r>
+            <a:r>
+              <a:rPr lang="en-US" sz="1000" b="1" dirty="0">
+                <a:solidFill>
+                  <a:schemeClr val="tx1"/>
+                </a:solidFill>
+                <a:latin typeface="Arial" panose="020B0604020202020204" pitchFamily="34" charset="0"/>
+                <a:cs typeface="Arial" panose="020B0604020202020204" pitchFamily="34" charset="0"/>
+              </a:rPr>
+              <a:t>, </a:t>
+            </a:r>
+            <a:r>
+              <a:rPr lang="en-US" sz="1000" b="1" dirty="0" err="1">
+                <a:solidFill>
+                  <a:schemeClr val="tx1"/>
+                </a:solidFill>
+                <a:latin typeface="Arial" panose="020B0604020202020204" pitchFamily="34" charset="0"/>
+                <a:cs typeface="Arial" panose="020B0604020202020204" pitchFamily="34" charset="0"/>
+              </a:rPr>
+              <a:t>contentName</a:t>
+            </a:r>
+            <a:r>
+              <a:rPr lang="en-US" sz="1000" b="1" dirty="0">
+                <a:solidFill>
+                  <a:schemeClr val="tx1"/>
+                </a:solidFill>
+                <a:latin typeface="Arial" panose="020B0604020202020204" pitchFamily="34" charset="0"/>
+                <a:cs typeface="Arial" panose="020B0604020202020204" pitchFamily="34" charset="0"/>
+              </a:rPr>
+              <a:t>, </a:t>
+            </a:r>
+            <a:r>
+              <a:rPr lang="en-US" sz="1000" b="1" dirty="0" err="1">
+                <a:solidFill>
+                  <a:schemeClr val="tx1"/>
+                </a:solidFill>
+                <a:latin typeface="Arial" panose="020B0604020202020204" pitchFamily="34" charset="0"/>
+                <a:cs typeface="Arial" panose="020B0604020202020204" pitchFamily="34" charset="0"/>
+              </a:rPr>
+              <a:t>contentInfoName</a:t>
+            </a:r>
+            <a:r>
+              <a:rPr lang="en-US" sz="1000" b="1" dirty="0">
+                <a:solidFill>
+                  <a:schemeClr val="tx1"/>
+                </a:solidFill>
+                <a:latin typeface="Arial" panose="020B0604020202020204" pitchFamily="34" charset="0"/>
+                <a:cs typeface="Arial" panose="020B0604020202020204" pitchFamily="34" charset="0"/>
+              </a:rPr>
+              <a:t>, </a:t>
+            </a:r>
+            <a:r>
+              <a:rPr lang="en-US" sz="1000" b="1" dirty="0" err="1">
+                <a:solidFill>
+                  <a:schemeClr val="tx1"/>
+                </a:solidFill>
+                <a:latin typeface="Arial" panose="020B0604020202020204" pitchFamily="34" charset="0"/>
+                <a:cs typeface="Arial" panose="020B0604020202020204" pitchFamily="34" charset="0"/>
+              </a:rPr>
+              <a:t>contentEmailInfo</a:t>
+            </a:r>
+            <a:r>
+              <a:rPr lang="en-US" sz="1000" b="1" dirty="0">
+                <a:solidFill>
+                  <a:schemeClr val="tx1"/>
+                </a:solidFill>
+                <a:latin typeface="Arial" panose="020B0604020202020204" pitchFamily="34" charset="0"/>
+                <a:cs typeface="Arial" panose="020B0604020202020204" pitchFamily="34" charset="0"/>
+              </a:rPr>
+              <a:t>, </a:t>
+            </a:r>
+            <a:r>
+              <a:rPr lang="en-US" sz="1000" b="1" dirty="0" err="1">
+                <a:solidFill>
+                  <a:schemeClr val="tx1"/>
+                </a:solidFill>
+                <a:latin typeface="Arial" panose="020B0604020202020204" pitchFamily="34" charset="0"/>
+                <a:cs typeface="Arial" panose="020B0604020202020204" pitchFamily="34" charset="0"/>
+              </a:rPr>
+              <a:t>contentInfoEmail</a:t>
+            </a:r>
+            <a:r>
+              <a:rPr lang="en-US" sz="1000" b="1" dirty="0">
+                <a:solidFill>
+                  <a:schemeClr val="tx1"/>
+                </a:solidFill>
+                <a:latin typeface="Arial" panose="020B0604020202020204" pitchFamily="34" charset="0"/>
+                <a:cs typeface="Arial" panose="020B0604020202020204" pitchFamily="34" charset="0"/>
+              </a:rPr>
+              <a:t>, </a:t>
+            </a:r>
+            <a:r>
+              <a:rPr lang="en-US" sz="1000" b="1" dirty="0" err="1">
+                <a:solidFill>
+                  <a:schemeClr val="tx1"/>
+                </a:solidFill>
+                <a:latin typeface="Arial" panose="020B0604020202020204" pitchFamily="34" charset="0"/>
+                <a:cs typeface="Arial" panose="020B0604020202020204" pitchFamily="34" charset="0"/>
+              </a:rPr>
+              <a:t>contentRemarkInfo</a:t>
+            </a:r>
+            <a:r>
+              <a:rPr lang="en-US" sz="1000" b="1" dirty="0">
+                <a:solidFill>
+                  <a:schemeClr val="tx1"/>
+                </a:solidFill>
+                <a:latin typeface="Arial" panose="020B0604020202020204" pitchFamily="34" charset="0"/>
+                <a:cs typeface="Arial" panose="020B0604020202020204" pitchFamily="34" charset="0"/>
+              </a:rPr>
+              <a:t>, </a:t>
+            </a:r>
+            <a:r>
+              <a:rPr lang="en-US" sz="1000" b="1" dirty="0" err="1">
+                <a:solidFill>
+                  <a:schemeClr val="tx1"/>
+                </a:solidFill>
+                <a:latin typeface="Arial" panose="020B0604020202020204" pitchFamily="34" charset="0"/>
+                <a:cs typeface="Arial" panose="020B0604020202020204" pitchFamily="34" charset="0"/>
+              </a:rPr>
+              <a:t>contentRemark</a:t>
+            </a:r>
+            <a:r>
+              <a:rPr lang="en-US" sz="1000" b="1" dirty="0">
+                <a:solidFill>
+                  <a:schemeClr val="tx1"/>
+                </a:solidFill>
+                <a:latin typeface="Arial" panose="020B0604020202020204" pitchFamily="34" charset="0"/>
+                <a:cs typeface="Arial" panose="020B0604020202020204" pitchFamily="34" charset="0"/>
+              </a:rPr>
+              <a:t>, </a:t>
+            </a:r>
+            <a:r>
+              <a:rPr lang="en-US" sz="1000" b="1" dirty="0" err="1">
+                <a:solidFill>
+                  <a:schemeClr val="tx1"/>
+                </a:solidFill>
+                <a:latin typeface="Arial" panose="020B0604020202020204" pitchFamily="34" charset="0"/>
+                <a:cs typeface="Arial" panose="020B0604020202020204" pitchFamily="34" charset="0"/>
+              </a:rPr>
+              <a:t>contentInfoRemark</a:t>
+            </a:r>
+            <a:r>
+              <a:rPr lang="en-US" sz="1000" b="1" dirty="0">
+                <a:solidFill>
+                  <a:schemeClr val="tx1"/>
+                </a:solidFill>
+                <a:latin typeface="Arial" panose="020B0604020202020204" pitchFamily="34" charset="0"/>
+                <a:cs typeface="Arial" panose="020B0604020202020204" pitchFamily="34" charset="0"/>
+              </a:rPr>
+              <a:t>, </a:t>
+            </a:r>
+            <a:r>
+              <a:rPr lang="en-US" sz="1000" b="1" dirty="0" err="1">
+                <a:solidFill>
+                  <a:schemeClr val="tx1"/>
+                </a:solidFill>
+                <a:latin typeface="Arial" panose="020B0604020202020204" pitchFamily="34" charset="0"/>
+                <a:cs typeface="Arial" panose="020B0604020202020204" pitchFamily="34" charset="0"/>
+              </a:rPr>
+              <a:t>contentPrices</a:t>
+            </a:r>
+            <a:r>
+              <a:rPr lang="en-US" sz="1000" b="1" dirty="0">
+                <a:solidFill>
+                  <a:schemeClr val="tx1"/>
+                </a:solidFill>
+                <a:latin typeface="Arial" panose="020B0604020202020204" pitchFamily="34" charset="0"/>
+                <a:cs typeface="Arial" panose="020B0604020202020204" pitchFamily="34" charset="0"/>
+              </a:rPr>
+              <a:t>, </a:t>
+            </a:r>
+            <a:r>
+              <a:rPr lang="en-US" sz="1000" b="1" dirty="0" err="1">
+                <a:solidFill>
+                  <a:schemeClr val="tx1"/>
+                </a:solidFill>
+                <a:latin typeface="Arial" panose="020B0604020202020204" pitchFamily="34" charset="0"/>
+                <a:cs typeface="Arial" panose="020B0604020202020204" pitchFamily="34" charset="0"/>
+              </a:rPr>
+              <a:t>contentInstructions</a:t>
+            </a:r>
             <a:endParaRPr lang="en-US" sz="1000" b="1" dirty="0">
               <a:solidFill>
                 <a:schemeClr val="tx1"/>
@@ -7112,6 +7373,15 @@
             </a:endParaRPr>
           </a:p>
           <a:p>
+            <a:endParaRPr lang="en-US" sz="1000" b="1" dirty="0">
+              <a:solidFill>
+                <a:schemeClr val="tx1"/>
+              </a:solidFill>
+              <a:latin typeface="Arial" panose="020B0604020202020204" pitchFamily="34" charset="0"/>
+              <a:cs typeface="Arial" panose="020B0604020202020204" pitchFamily="34" charset="0"/>
+            </a:endParaRPr>
+          </a:p>
+          <a:p>
             <a:r>
               <a:rPr lang="en-US" sz="1000" b="1" dirty="0" err="1">
                 <a:solidFill>
@@ -7120,8 +7390,180 @@
                 <a:latin typeface="Arial" panose="020B0604020202020204" pitchFamily="34" charset="0"/>
                 <a:cs typeface="Arial" panose="020B0604020202020204" pitchFamily="34" charset="0"/>
               </a:rPr>
-              <a:t>contentLabelEmail</a:t>
-            </a:r>
+              <a:t>dropdownGetEventNumber</a:t>
+            </a:r>
+            <a:r>
+              <a:rPr lang="en-US" sz="1000" b="1" dirty="0">
+                <a:solidFill>
+                  <a:schemeClr val="tx1"/>
+                </a:solidFill>
+                <a:latin typeface="Arial" panose="020B0604020202020204" pitchFamily="34" charset="0"/>
+                <a:cs typeface="Arial" panose="020B0604020202020204" pitchFamily="34" charset="0"/>
+              </a:rPr>
+              <a:t>, </a:t>
+            </a:r>
+            <a:r>
+              <a:rPr lang="en-US" sz="1000" b="1" dirty="0" err="1">
+                <a:solidFill>
+                  <a:schemeClr val="tx1"/>
+                </a:solidFill>
+                <a:latin typeface="Arial" panose="020B0604020202020204" pitchFamily="34" charset="0"/>
+                <a:cs typeface="Arial" panose="020B0604020202020204" pitchFamily="34" charset="0"/>
+              </a:rPr>
+              <a:t>dropdownSetEventNumber</a:t>
+            </a:r>
+            <a:r>
+              <a:rPr lang="en-US" sz="1000" b="1" dirty="0">
+                <a:solidFill>
+                  <a:schemeClr val="tx1"/>
+                </a:solidFill>
+                <a:latin typeface="Arial" panose="020B0604020202020204" pitchFamily="34" charset="0"/>
+                <a:cs typeface="Arial" panose="020B0604020202020204" pitchFamily="34" charset="0"/>
+              </a:rPr>
+              <a:t>, </a:t>
+            </a:r>
+            <a:r>
+              <a:rPr lang="en-US" sz="1000" b="1" dirty="0" err="1">
+                <a:solidFill>
+                  <a:schemeClr val="tx1"/>
+                </a:solidFill>
+                <a:latin typeface="Arial" panose="020B0604020202020204" pitchFamily="34" charset="0"/>
+                <a:cs typeface="Arial" panose="020B0604020202020204" pitchFamily="34" charset="0"/>
+              </a:rPr>
+              <a:t>dropdownSetTitle</a:t>
+            </a:r>
+            <a:r>
+              <a:rPr lang="en-US" sz="1000" b="1" dirty="0">
+                <a:solidFill>
+                  <a:schemeClr val="tx1"/>
+                </a:solidFill>
+                <a:latin typeface="Arial" panose="020B0604020202020204" pitchFamily="34" charset="0"/>
+                <a:cs typeface="Arial" panose="020B0604020202020204" pitchFamily="34" charset="0"/>
+              </a:rPr>
+              <a:t>, </a:t>
+            </a:r>
+            <a:r>
+              <a:rPr lang="en-US" sz="1000" b="1" dirty="0" err="1">
+                <a:solidFill>
+                  <a:schemeClr val="tx1"/>
+                </a:solidFill>
+                <a:latin typeface="Arial" panose="020B0604020202020204" pitchFamily="34" charset="0"/>
+                <a:cs typeface="Arial" panose="020B0604020202020204" pitchFamily="34" charset="0"/>
+              </a:rPr>
+              <a:t>dropdownGetDateFormat</a:t>
+            </a:r>
+            <a:r>
+              <a:rPr lang="en-US" sz="1000" b="1" dirty="0">
+                <a:solidFill>
+                  <a:schemeClr val="tx1"/>
+                </a:solidFill>
+                <a:latin typeface="Arial" panose="020B0604020202020204" pitchFamily="34" charset="0"/>
+                <a:cs typeface="Arial" panose="020B0604020202020204" pitchFamily="34" charset="0"/>
+              </a:rPr>
+              <a:t>, </a:t>
+            </a:r>
+            <a:r>
+              <a:rPr lang="en-US" sz="1000" b="1" dirty="0" err="1">
+                <a:solidFill>
+                  <a:schemeClr val="tx1"/>
+                </a:solidFill>
+                <a:latin typeface="Arial" panose="020B0604020202020204" pitchFamily="34" charset="0"/>
+                <a:cs typeface="Arial" panose="020B0604020202020204" pitchFamily="34" charset="0"/>
+              </a:rPr>
+              <a:t>dropdownSetDateFormatToIso</a:t>
+            </a:r>
+            <a:r>
+              <a:rPr lang="en-US" sz="1000" b="1" dirty="0">
+                <a:solidFill>
+                  <a:schemeClr val="tx1"/>
+                </a:solidFill>
+                <a:latin typeface="Arial" panose="020B0604020202020204" pitchFamily="34" charset="0"/>
+                <a:cs typeface="Arial" panose="020B0604020202020204" pitchFamily="34" charset="0"/>
+              </a:rPr>
+              <a:t>, </a:t>
+            </a:r>
+            <a:r>
+              <a:rPr lang="en-US" sz="1000" b="1" dirty="0" err="1">
+                <a:solidFill>
+                  <a:schemeClr val="tx1"/>
+                </a:solidFill>
+                <a:latin typeface="Arial" panose="020B0604020202020204" pitchFamily="34" charset="0"/>
+                <a:cs typeface="Arial" panose="020B0604020202020204" pitchFamily="34" charset="0"/>
+              </a:rPr>
+              <a:t>dropdownSetDateFormatToIsoReverse</a:t>
+            </a:r>
+            <a:r>
+              <a:rPr lang="en-US" sz="1000" b="1" dirty="0">
+                <a:solidFill>
+                  <a:schemeClr val="tx1"/>
+                </a:solidFill>
+                <a:latin typeface="Arial" panose="020B0604020202020204" pitchFamily="34" charset="0"/>
+                <a:cs typeface="Arial" panose="020B0604020202020204" pitchFamily="34" charset="0"/>
+              </a:rPr>
+              <a:t>, </a:t>
+            </a:r>
+            <a:r>
+              <a:rPr lang="en-US" sz="1000" b="1" dirty="0" err="1">
+                <a:solidFill>
+                  <a:schemeClr val="tx1"/>
+                </a:solidFill>
+                <a:latin typeface="Arial" panose="020B0604020202020204" pitchFamily="34" charset="0"/>
+                <a:cs typeface="Arial" panose="020B0604020202020204" pitchFamily="34" charset="0"/>
+              </a:rPr>
+              <a:t>dropdownSetDateFormatToSwiss</a:t>
+            </a:r>
+            <a:r>
+              <a:rPr lang="en-US" sz="1000" b="1" dirty="0">
+                <a:solidFill>
+                  <a:schemeClr val="tx1"/>
+                </a:solidFill>
+                <a:latin typeface="Arial" panose="020B0604020202020204" pitchFamily="34" charset="0"/>
+                <a:cs typeface="Arial" panose="020B0604020202020204" pitchFamily="34" charset="0"/>
+              </a:rPr>
+              <a:t>, </a:t>
+            </a:r>
+            <a:r>
+              <a:rPr lang="en-US" sz="1000" b="1" dirty="0" err="1">
+                <a:solidFill>
+                  <a:schemeClr val="tx1"/>
+                </a:solidFill>
+                <a:latin typeface="Arial" panose="020B0604020202020204" pitchFamily="34" charset="0"/>
+                <a:cs typeface="Arial" panose="020B0604020202020204" pitchFamily="34" charset="0"/>
+              </a:rPr>
+              <a:t>dropdownDisplayDateAndNameInDropdown</a:t>
+            </a:r>
+            <a:r>
+              <a:rPr lang="en-US" sz="1000" b="1" dirty="0">
+                <a:solidFill>
+                  <a:schemeClr val="tx1"/>
+                </a:solidFill>
+                <a:latin typeface="Arial" panose="020B0604020202020204" pitchFamily="34" charset="0"/>
+                <a:cs typeface="Arial" panose="020B0604020202020204" pitchFamily="34" charset="0"/>
+              </a:rPr>
+              <a:t>, </a:t>
+            </a:r>
+            <a:r>
+              <a:rPr lang="en-US" sz="1000" b="1" dirty="0" err="1">
+                <a:solidFill>
+                  <a:schemeClr val="tx1"/>
+                </a:solidFill>
+                <a:latin typeface="Arial" panose="020B0604020202020204" pitchFamily="34" charset="0"/>
+                <a:cs typeface="Arial" panose="020B0604020202020204" pitchFamily="34" charset="0"/>
+              </a:rPr>
+              <a:t>dropdownDisplayOnlyNameInDropdown</a:t>
+            </a:r>
+            <a:r>
+              <a:rPr lang="en-US" sz="1000" b="1" dirty="0">
+                <a:solidFill>
+                  <a:schemeClr val="tx1"/>
+                </a:solidFill>
+                <a:latin typeface="Arial" panose="020B0604020202020204" pitchFamily="34" charset="0"/>
+                <a:cs typeface="Arial" panose="020B0604020202020204" pitchFamily="34" charset="0"/>
+              </a:rPr>
+              <a:t> </a:t>
+            </a:r>
+          </a:p>
+          <a:p>
             <a:endParaRPr lang="en-US" sz="1000" b="1" dirty="0">
               <a:solidFill>
                 <a:schemeClr val="tx1"/>
@@ -7139,254 +7581,18 @@
                 <a:latin typeface="Arial" panose="020B0604020202020204" pitchFamily="34" charset="0"/>
                 <a:cs typeface="Arial" panose="020B0604020202020204" pitchFamily="34" charset="0"/>
               </a:rPr>
-              <a:t>contentLabelRemark</a:t>
-            </a:r>
-            <a:endParaRPr lang="en-US" sz="1000" b="1" dirty="0">
-              <a:solidFill>
-                <a:schemeClr val="tx1"/>
-              </a:solidFill>
-              <a:latin typeface="Arial" panose="020B0604020202020204" pitchFamily="34" charset="0"/>
-              <a:cs typeface="Arial" panose="020B0604020202020204" pitchFamily="34" charset="0"/>
-            </a:endParaRPr>
-          </a:p>
-          <a:p>
-            <a:r>
-              <a:rPr lang="en-US" sz="1000" b="1" dirty="0" err="1">
-                <a:solidFill>
-                  <a:schemeClr val="tx1"/>
-                </a:solidFill>
-                <a:latin typeface="Arial" panose="020B0604020202020204" pitchFamily="34" charset="0"/>
-                <a:cs typeface="Arial" panose="020B0604020202020204" pitchFamily="34" charset="0"/>
-              </a:rPr>
-              <a:t>contentDropdown</a:t>
-            </a:r>
-            <a:endParaRPr lang="en-US" sz="1000" b="1" dirty="0">
-              <a:solidFill>
-                <a:schemeClr val="tx1"/>
-              </a:solidFill>
-              <a:latin typeface="Arial" panose="020B0604020202020204" pitchFamily="34" charset="0"/>
-              <a:cs typeface="Arial" panose="020B0604020202020204" pitchFamily="34" charset="0"/>
-            </a:endParaRPr>
-          </a:p>
-          <a:p>
-            <a:r>
-              <a:rPr lang="en-US" sz="1000" b="1" dirty="0" err="1">
-                <a:solidFill>
-                  <a:schemeClr val="tx1"/>
-                </a:solidFill>
-                <a:latin typeface="Arial" panose="020B0604020202020204" pitchFamily="34" charset="0"/>
-                <a:cs typeface="Arial" panose="020B0604020202020204" pitchFamily="34" charset="0"/>
-              </a:rPr>
-              <a:t>contentNameInfo</a:t>
-            </a:r>
-            <a:endParaRPr lang="en-US" sz="1000" b="1" dirty="0">
-              <a:solidFill>
-                <a:schemeClr val="tx1"/>
-              </a:solidFill>
-              <a:latin typeface="Arial" panose="020B0604020202020204" pitchFamily="34" charset="0"/>
-              <a:cs typeface="Arial" panose="020B0604020202020204" pitchFamily="34" charset="0"/>
-            </a:endParaRPr>
-          </a:p>
-          <a:p>
-            <a:r>
-              <a:rPr lang="en-US" sz="1000" b="1" dirty="0" err="1">
-                <a:solidFill>
-                  <a:schemeClr val="tx1"/>
-                </a:solidFill>
-                <a:latin typeface="Arial" panose="020B0604020202020204" pitchFamily="34" charset="0"/>
-                <a:cs typeface="Arial" panose="020B0604020202020204" pitchFamily="34" charset="0"/>
-              </a:rPr>
-              <a:t>contentName</a:t>
-            </a:r>
-            <a:endParaRPr lang="en-US" sz="1000" b="1" dirty="0">
-              <a:solidFill>
-                <a:schemeClr val="tx1"/>
-              </a:solidFill>
-              <a:latin typeface="Arial" panose="020B0604020202020204" pitchFamily="34" charset="0"/>
-              <a:cs typeface="Arial" panose="020B0604020202020204" pitchFamily="34" charset="0"/>
-            </a:endParaRPr>
-          </a:p>
-          <a:p>
-            <a:r>
-              <a:rPr lang="en-US" sz="1000" b="1" dirty="0" err="1">
-                <a:solidFill>
-                  <a:schemeClr val="tx1"/>
-                </a:solidFill>
-                <a:latin typeface="Arial" panose="020B0604020202020204" pitchFamily="34" charset="0"/>
-                <a:cs typeface="Arial" panose="020B0604020202020204" pitchFamily="34" charset="0"/>
-              </a:rPr>
-              <a:t>contentInfoName</a:t>
-            </a:r>
-            <a:endParaRPr lang="en-US" sz="1000" b="1" dirty="0">
-              <a:solidFill>
-                <a:schemeClr val="tx1"/>
-              </a:solidFill>
-              <a:latin typeface="Arial" panose="020B0604020202020204" pitchFamily="34" charset="0"/>
-              <a:cs typeface="Arial" panose="020B0604020202020204" pitchFamily="34" charset="0"/>
-            </a:endParaRPr>
-          </a:p>
-          <a:p>
-            <a:r>
-              <a:rPr lang="en-US" sz="1000" b="1" dirty="0" err="1">
-                <a:solidFill>
-                  <a:schemeClr val="tx1"/>
-                </a:solidFill>
-                <a:latin typeface="Arial" panose="020B0604020202020204" pitchFamily="34" charset="0"/>
-                <a:cs typeface="Arial" panose="020B0604020202020204" pitchFamily="34" charset="0"/>
-              </a:rPr>
-              <a:t>contentEmailInfo</a:t>
-            </a:r>
-            <a:endParaRPr lang="en-US" sz="1000" b="1" dirty="0">
-              <a:solidFill>
-                <a:schemeClr val="tx1"/>
-              </a:solidFill>
-              <a:latin typeface="Arial" panose="020B0604020202020204" pitchFamily="34" charset="0"/>
-              <a:cs typeface="Arial" panose="020B0604020202020204" pitchFamily="34" charset="0"/>
-            </a:endParaRPr>
-          </a:p>
-          <a:p>
-            <a:r>
-              <a:rPr lang="en-US" sz="1000" b="1" dirty="0" err="1">
-                <a:solidFill>
-                  <a:schemeClr val="tx1"/>
-                </a:solidFill>
-                <a:latin typeface="Arial" panose="020B0604020202020204" pitchFamily="34" charset="0"/>
-                <a:cs typeface="Arial" panose="020B0604020202020204" pitchFamily="34" charset="0"/>
-              </a:rPr>
-              <a:t>contentInfoEmail</a:t>
-            </a:r>
-            <a:endParaRPr lang="en-US" sz="1000" b="1" dirty="0">
-              <a:solidFill>
-                <a:schemeClr val="tx1"/>
-              </a:solidFill>
-              <a:latin typeface="Arial" panose="020B0604020202020204" pitchFamily="34" charset="0"/>
-              <a:cs typeface="Arial" panose="020B0604020202020204" pitchFamily="34" charset="0"/>
-            </a:endParaRPr>
-          </a:p>
-          <a:p>
-            <a:r>
-              <a:rPr lang="en-US" sz="1000" b="1" dirty="0" err="1">
-                <a:solidFill>
-                  <a:schemeClr val="tx1"/>
-                </a:solidFill>
-                <a:latin typeface="Arial" panose="020B0604020202020204" pitchFamily="34" charset="0"/>
-                <a:cs typeface="Arial" panose="020B0604020202020204" pitchFamily="34" charset="0"/>
-              </a:rPr>
-              <a:t>contentRemarkInfo</a:t>
-            </a:r>
-            <a:endParaRPr lang="en-US" sz="1000" b="1" dirty="0">
-              <a:solidFill>
-                <a:schemeClr val="tx1"/>
-              </a:solidFill>
-              <a:latin typeface="Arial" panose="020B0604020202020204" pitchFamily="34" charset="0"/>
-              <a:cs typeface="Arial" panose="020B0604020202020204" pitchFamily="34" charset="0"/>
-            </a:endParaRPr>
-          </a:p>
-          <a:p>
-            <a:r>
-              <a:rPr lang="en-US" sz="1000" b="1" dirty="0" err="1">
-                <a:solidFill>
-                  <a:schemeClr val="tx1"/>
-                </a:solidFill>
-                <a:latin typeface="Arial" panose="020B0604020202020204" pitchFamily="34" charset="0"/>
-                <a:cs typeface="Arial" panose="020B0604020202020204" pitchFamily="34" charset="0"/>
-              </a:rPr>
-              <a:t>contentRemark</a:t>
-            </a:r>
-            <a:endParaRPr lang="en-US" sz="1000" b="1" dirty="0">
-              <a:solidFill>
-                <a:schemeClr val="tx1"/>
-              </a:solidFill>
-              <a:latin typeface="Arial" panose="020B0604020202020204" pitchFamily="34" charset="0"/>
-              <a:cs typeface="Arial" panose="020B0604020202020204" pitchFamily="34" charset="0"/>
-            </a:endParaRPr>
-          </a:p>
-          <a:p>
-            <a:r>
-              <a:rPr lang="en-US" sz="1000" b="1" dirty="0" err="1">
-                <a:solidFill>
-                  <a:schemeClr val="tx1"/>
-                </a:solidFill>
-                <a:latin typeface="Arial" panose="020B0604020202020204" pitchFamily="34" charset="0"/>
-                <a:cs typeface="Arial" panose="020B0604020202020204" pitchFamily="34" charset="0"/>
-              </a:rPr>
-              <a:t>contentInfoRemark</a:t>
-            </a:r>
-            <a:endParaRPr lang="en-US" sz="1000" b="1" dirty="0">
-              <a:solidFill>
-                <a:schemeClr val="tx1"/>
-              </a:solidFill>
-              <a:latin typeface="Arial" panose="020B0604020202020204" pitchFamily="34" charset="0"/>
-              <a:cs typeface="Arial" panose="020B0604020202020204" pitchFamily="34" charset="0"/>
-            </a:endParaRPr>
-          </a:p>
-          <a:p>
-            <a:r>
-              <a:rPr lang="en-US" sz="1000" b="1" dirty="0" err="1">
-                <a:solidFill>
-                  <a:schemeClr val="tx1"/>
-                </a:solidFill>
-                <a:latin typeface="Arial" panose="020B0604020202020204" pitchFamily="34" charset="0"/>
-                <a:cs typeface="Arial" panose="020B0604020202020204" pitchFamily="34" charset="0"/>
-              </a:rPr>
-              <a:t>contentPrices</a:t>
-            </a:r>
-            <a:endParaRPr lang="en-US" sz="1000" b="1" dirty="0">
-              <a:solidFill>
-                <a:schemeClr val="tx1"/>
-              </a:solidFill>
-              <a:latin typeface="Arial" panose="020B0604020202020204" pitchFamily="34" charset="0"/>
-              <a:cs typeface="Arial" panose="020B0604020202020204" pitchFamily="34" charset="0"/>
-            </a:endParaRPr>
-          </a:p>
-          <a:p>
-            <a:r>
-              <a:rPr lang="en-US" sz="1000" b="1" dirty="0" err="1">
-                <a:solidFill>
-                  <a:schemeClr val="tx1"/>
-                </a:solidFill>
-                <a:latin typeface="Arial" panose="020B0604020202020204" pitchFamily="34" charset="0"/>
-                <a:cs typeface="Arial" panose="020B0604020202020204" pitchFamily="34" charset="0"/>
-              </a:rPr>
-              <a:t>contentInstructions</a:t>
-            </a:r>
-            <a:endParaRPr lang="en-US" sz="1000" b="1" dirty="0">
-              <a:solidFill>
-                <a:schemeClr val="tx1"/>
-              </a:solidFill>
-              <a:latin typeface="Arial" panose="020B0604020202020204" pitchFamily="34" charset="0"/>
-              <a:cs typeface="Arial" panose="020B0604020202020204" pitchFamily="34" charset="0"/>
-            </a:endParaRPr>
-          </a:p>
-          <a:p>
-            <a:endParaRPr lang="en-US" sz="1000" b="1" dirty="0">
-              <a:solidFill>
-                <a:schemeClr val="tx1"/>
-              </a:solidFill>
-              <a:latin typeface="Arial" panose="020B0604020202020204" pitchFamily="34" charset="0"/>
-              <a:cs typeface="Arial" panose="020B0604020202020204" pitchFamily="34" charset="0"/>
-            </a:endParaRPr>
-          </a:p>
-          <a:p>
-            <a:r>
-              <a:rPr lang="en-US" sz="1000" b="1" dirty="0" err="1">
-                <a:solidFill>
-                  <a:schemeClr val="tx1"/>
-                </a:solidFill>
-                <a:latin typeface="Arial" panose="020B0604020202020204" pitchFamily="34" charset="0"/>
-                <a:cs typeface="Arial" panose="020B0604020202020204" pitchFamily="34" charset="0"/>
-              </a:rPr>
               <a:t>displayDropdown</a:t>
             </a:r>
-            <a:endParaRPr lang="en-US" sz="1000" b="1" dirty="0">
-              <a:solidFill>
-                <a:schemeClr val="tx1"/>
-              </a:solidFill>
-              <a:latin typeface="Arial" panose="020B0604020202020204" pitchFamily="34" charset="0"/>
-              <a:cs typeface="Arial" panose="020B0604020202020204" pitchFamily="34" charset="0"/>
-            </a:endParaRPr>
-          </a:p>
-          <a:p>
+            <a:r>
+              <a:rPr lang="en-US" sz="1000" b="1" dirty="0">
+                <a:solidFill>
+                  <a:schemeClr val="tx1"/>
+                </a:solidFill>
+                <a:latin typeface="Arial" panose="020B0604020202020204" pitchFamily="34" charset="0"/>
+                <a:cs typeface="Arial" panose="020B0604020202020204" pitchFamily="34" charset="0"/>
+              </a:rPr>
+              <a:t>, </a:t>
+            </a:r>
             <a:r>
               <a:rPr lang="en-US" sz="1000" b="1" dirty="0" err="1">
                 <a:solidFill>

</xml_diff>